<commit_message>
working on ewas sizes document
</commit_message>
<xml_diff>
--- a/docs/presentations/20220815/slides.pptx
+++ b/docs/presentations/20220815/slides.pptx
@@ -187,7 +187,7 @@
 <file path=ppt/revisionInfo.xml><?xml version="1.0" encoding="utf-8"?>
 <p1510:revInfo xmlns:a="http://schemas.openxmlformats.org/drawingml/2006/main" xmlns:r="http://schemas.openxmlformats.org/officeDocument/2006/relationships" xmlns:p1510="http://schemas.microsoft.com/office/powerpoint/2015/10/main">
   <p1510:revLst>
-    <p1510:client id="{32A2F439-705B-473C-83AE-FA95EEBBDC32}" v="200" dt="2022-08-16T07:32:42.268"/>
+    <p1510:client id="{32A2F439-705B-473C-83AE-FA95EEBBDC32}" v="202" dt="2022-12-01T12:59:16.175"/>
   </p1510:revLst>
 </p1510:revInfo>
 </file>
@@ -8612,7 +8612,7 @@
   <pc:docChgLst>
     <pc:chgData name="Matthew Suderman" userId="2709995e-3ea8-4fb0-9b62-eb8034dec529" providerId="ADAL" clId="{32A2F439-705B-473C-83AE-FA95EEBBDC32}"/>
     <pc:docChg chg="undo custSel addSld delSld modSld sldOrd">
-      <pc:chgData name="Matthew Suderman" userId="2709995e-3ea8-4fb0-9b62-eb8034dec529" providerId="ADAL" clId="{32A2F439-705B-473C-83AE-FA95EEBBDC32}" dt="2022-08-16T07:33:39.478" v="8680" actId="1582"/>
+      <pc:chgData name="Matthew Suderman" userId="2709995e-3ea8-4fb0-9b62-eb8034dec529" providerId="ADAL" clId="{32A2F439-705B-473C-83AE-FA95EEBBDC32}" dt="2022-12-01T12:59:14.400" v="8681"/>
       <pc:docMkLst>
         <pc:docMk/>
       </pc:docMkLst>
@@ -8794,7 +8794,7 @@
         </pc:sldMkLst>
       </pc:sldChg>
       <pc:sldChg chg="modSp add mod">
-        <pc:chgData name="Matthew Suderman" userId="2709995e-3ea8-4fb0-9b62-eb8034dec529" providerId="ADAL" clId="{32A2F439-705B-473C-83AE-FA95EEBBDC32}" dt="2022-08-12T22:27:17.380" v="302" actId="122"/>
+        <pc:chgData name="Matthew Suderman" userId="2709995e-3ea8-4fb0-9b62-eb8034dec529" providerId="ADAL" clId="{32A2F439-705B-473C-83AE-FA95EEBBDC32}" dt="2022-12-01T12:59:14.400" v="8681"/>
         <pc:sldMkLst>
           <pc:docMk/>
           <pc:sldMk cId="1535385012" sldId="314"/>
@@ -8808,7 +8808,7 @@
           </ac:spMkLst>
         </pc:spChg>
         <pc:graphicFrameChg chg="mod modGraphic">
-          <ac:chgData name="Matthew Suderman" userId="2709995e-3ea8-4fb0-9b62-eb8034dec529" providerId="ADAL" clId="{32A2F439-705B-473C-83AE-FA95EEBBDC32}" dt="2022-08-12T22:27:17.380" v="302" actId="122"/>
+          <ac:chgData name="Matthew Suderman" userId="2709995e-3ea8-4fb0-9b62-eb8034dec529" providerId="ADAL" clId="{32A2F439-705B-473C-83AE-FA95EEBBDC32}" dt="2022-12-01T12:59:14.400" v="8681"/>
           <ac:graphicFrameMkLst>
             <pc:docMk/>
             <pc:sldMk cId="1535385012" sldId="314"/>
@@ -16417,7 +16417,7 @@
                     <a:p>
                       <a:pPr algn="ctr" fontAlgn="b"/>
                       <a:r>
-                        <a:rPr lang="en-US" sz="1600" b="0" i="0" u="none" strike="noStrike">
+                        <a:rPr lang="en-US" sz="1600" b="0" i="0" u="none" strike="noStrike" dirty="0">
                           <a:solidFill>
                             <a:srgbClr val="000000"/>
                           </a:solidFill>
@@ -16808,7 +16808,7 @@
                     <a:p>
                       <a:pPr algn="ctr" fontAlgn="b"/>
                       <a:r>
-                        <a:rPr lang="en-US" sz="1600" b="0" i="0" u="none" strike="noStrike">
+                        <a:rPr lang="en-US" sz="1600" b="0" i="0" u="none" strike="noStrike" dirty="0">
                           <a:solidFill>
                             <a:srgbClr val="000000"/>
                           </a:solidFill>
@@ -17334,7 +17334,7 @@
                     <a:p>
                       <a:pPr algn="ctr" fontAlgn="b"/>
                       <a:r>
-                        <a:rPr lang="en-US" sz="1600" b="0" i="0" u="none" strike="noStrike">
+                        <a:rPr lang="en-US" sz="1600" b="0" i="0" u="none" strike="noStrike" dirty="0">
                           <a:solidFill>
                             <a:srgbClr val="000000"/>
                           </a:solidFill>
@@ -17725,7 +17725,7 @@
                     <a:p>
                       <a:pPr algn="ctr" fontAlgn="b"/>
                       <a:r>
-                        <a:rPr lang="en-US" sz="1600" b="0" i="0" u="none" strike="noStrike">
+                        <a:rPr lang="en-US" sz="1600" b="0" i="0" u="none" strike="noStrike" dirty="0">
                           <a:solidFill>
                             <a:srgbClr val="000000"/>
                           </a:solidFill>
@@ -18116,7 +18116,7 @@
                     <a:p>
                       <a:pPr algn="ctr" fontAlgn="b"/>
                       <a:r>
-                        <a:rPr lang="en-US" sz="1600" b="0" i="0" u="none" strike="noStrike">
+                        <a:rPr lang="en-US" sz="1600" b="0" i="0" u="none" strike="noStrike" dirty="0">
                           <a:solidFill>
                             <a:srgbClr val="000000"/>
                           </a:solidFill>
@@ -19357,7 +19357,7 @@
                     <a:p>
                       <a:pPr algn="ctr" fontAlgn="b"/>
                       <a:r>
-                        <a:rPr lang="en-US" sz="1600" b="0" i="0" u="none" strike="noStrike">
+                        <a:rPr lang="en-US" sz="1600" b="0" i="0" u="none" strike="noStrike" dirty="0">
                           <a:solidFill>
                             <a:srgbClr val="000000"/>
                           </a:solidFill>
@@ -19492,7 +19492,7 @@
                     <a:p>
                       <a:pPr algn="ctr" fontAlgn="b"/>
                       <a:r>
-                        <a:rPr lang="en-US" sz="1600" b="0" i="0" u="none" strike="noStrike">
+                        <a:rPr lang="en-US" sz="1600" b="0" i="0" u="none" strike="noStrike" dirty="0">
                           <a:solidFill>
                             <a:srgbClr val="000000"/>
                           </a:solidFill>
@@ -19748,7 +19748,7 @@
                     <a:p>
                       <a:pPr algn="ctr" fontAlgn="b"/>
                       <a:r>
-                        <a:rPr lang="en-US" sz="1600" b="0" i="0" u="none" strike="noStrike">
+                        <a:rPr lang="en-US" sz="1600" b="0" i="0" u="none" strike="noStrike" dirty="0">
                           <a:solidFill>
                             <a:srgbClr val="000000"/>
                           </a:solidFill>
@@ -19883,7 +19883,7 @@
                     <a:p>
                       <a:pPr algn="ctr" fontAlgn="b"/>
                       <a:r>
-                        <a:rPr lang="en-US" sz="1600" b="0" i="0" u="none" strike="noStrike">
+                        <a:rPr lang="en-US" sz="1600" b="0" i="0" u="none" strike="noStrike" dirty="0">
                           <a:solidFill>
                             <a:srgbClr val="000000"/>
                           </a:solidFill>
@@ -20139,7 +20139,7 @@
                     <a:p>
                       <a:pPr algn="ctr" fontAlgn="b"/>
                       <a:r>
-                        <a:rPr lang="en-US" sz="1600" b="0" i="0" u="none" strike="noStrike">
+                        <a:rPr lang="en-US" sz="1600" b="0" i="0" u="none" strike="noStrike" dirty="0">
                           <a:solidFill>
                             <a:srgbClr val="000000"/>
                           </a:solidFill>
@@ -20274,7 +20274,7 @@
                     <a:p>
                       <a:pPr algn="ctr" fontAlgn="b"/>
                       <a:r>
-                        <a:rPr lang="en-US" sz="1600" b="0" i="0" u="none" strike="noStrike">
+                        <a:rPr lang="en-US" sz="1600" b="0" i="0" u="none" strike="noStrike" dirty="0">
                           <a:solidFill>
                             <a:srgbClr val="000000"/>
                           </a:solidFill>
@@ -20530,7 +20530,7 @@
                     <a:p>
                       <a:pPr algn="ctr" fontAlgn="b"/>
                       <a:r>
-                        <a:rPr lang="en-US" sz="1600" b="0" i="0" u="none" strike="noStrike">
+                        <a:rPr lang="en-US" sz="1600" b="0" i="0" u="none" strike="noStrike" dirty="0">
                           <a:solidFill>
                             <a:srgbClr val="000000"/>
                           </a:solidFill>
@@ -20665,7 +20665,7 @@
                     <a:p>
                       <a:pPr algn="ctr" fontAlgn="b"/>
                       <a:r>
-                        <a:rPr lang="en-US" sz="1600" b="0" i="0" u="none" strike="noStrike">
+                        <a:rPr lang="en-US" sz="1600" b="0" i="0" u="none" strike="noStrike" dirty="0">
                           <a:solidFill>
                             <a:srgbClr val="000000"/>
                           </a:solidFill>
@@ -20921,14 +20921,34 @@
                     <a:p>
                       <a:pPr algn="ctr" fontAlgn="b"/>
                       <a:r>
-                        <a:rPr lang="en-US" sz="1600" b="0" i="0" u="none" strike="noStrike">
+                        <a:rPr lang="en-US" sz="1600" b="0" i="0" u="none" strike="noStrike" dirty="0">
                           <a:solidFill>
                             <a:srgbClr val="000000"/>
                           </a:solidFill>
                           <a:effectLst/>
                           <a:latin typeface="Calibri" panose="020F0502020204030204" pitchFamily="34" charset="0"/>
                         </a:rPr>
-                        <a:t>538 TwinsUK participants</a:t>
+                        <a:t>538 </a:t>
+                      </a:r>
+                      <a:r>
+                        <a:rPr lang="en-US" sz="1600" b="0" i="0" u="none" strike="noStrike" dirty="0" err="1">
+                          <a:solidFill>
+                            <a:srgbClr val="000000"/>
+                          </a:solidFill>
+                          <a:effectLst/>
+                          <a:latin typeface="Calibri" panose="020F0502020204030204" pitchFamily="34" charset="0"/>
+                        </a:rPr>
+                        <a:t>TwinsUK</a:t>
+                      </a:r>
+                      <a:r>
+                        <a:rPr lang="en-US" sz="1600" b="0" i="0" u="none" strike="noStrike" dirty="0">
+                          <a:solidFill>
+                            <a:srgbClr val="000000"/>
+                          </a:solidFill>
+                          <a:effectLst/>
+                          <a:latin typeface="Calibri" panose="020F0502020204030204" pitchFamily="34" charset="0"/>
+                        </a:rPr>
+                        <a:t> participants</a:t>
                       </a:r>
                     </a:p>
                   </a:txBody>
@@ -21306,7 +21326,7 @@
                     <a:p>
                       <a:pPr algn="ctr" fontAlgn="b"/>
                       <a:r>
-                        <a:rPr lang="en-US" sz="1600" b="0" i="0" u="none" strike="noStrike">
+                        <a:rPr lang="en-US" sz="1600" b="0" i="0" u="none" strike="noStrike" dirty="0">
                           <a:solidFill>
                             <a:srgbClr val="000000"/>
                           </a:solidFill>
@@ -32637,6 +32657,15 @@
 </file>
 
 <file path=customXml/item2.xml><?xml version="1.0" encoding="utf-8"?>
+<?mso-contentType ?>
+<FormTemplates xmlns="http://schemas.microsoft.com/sharepoint/v3/contenttype/forms">
+  <Display>DocumentLibraryForm</Display>
+  <Edit>DocumentLibraryForm</Edit>
+  <New>DocumentLibraryForm</New>
+</FormTemplates>
+</file>
+
+<file path=customXml/item3.xml><?xml version="1.0" encoding="utf-8"?>
 <ct:contentTypeSchema xmlns:ct="http://schemas.microsoft.com/office/2006/metadata/contentType" xmlns:ma="http://schemas.microsoft.com/office/2006/metadata/properties/metaAttributes" ct:_="" ma:_="" ma:contentTypeName="Document" ma:contentTypeID="0x010100A793F08E06F4AA448AC00C0C02C94845" ma:contentTypeVersion="4" ma:contentTypeDescription="Create a new document." ma:contentTypeScope="" ma:versionID="8ae8c0bcb362956bfd30c2611ca3a1f1">
   <xsd:schema xmlns:xsd="http://www.w3.org/2001/XMLSchema" xmlns:xs="http://www.w3.org/2001/XMLSchema" xmlns:p="http://schemas.microsoft.com/office/2006/metadata/properties" xmlns:ns2="2335683b-688a-4d49-ab37-bd32983a32ac" targetNamespace="http://schemas.microsoft.com/office/2006/metadata/properties" ma:root="true" ma:fieldsID="3c27dae60892398fbb9ade460898c2bd" ns2:_="">
     <xsd:import namespace="2335683b-688a-4d49-ab37-bd32983a32ac"/>
@@ -32782,15 +32811,6 @@
 </ct:contentTypeSchema>
 </file>
 
-<file path=customXml/item3.xml><?xml version="1.0" encoding="utf-8"?>
-<?mso-contentType ?>
-<FormTemplates xmlns="http://schemas.microsoft.com/sharepoint/v3/contenttype/forms">
-  <Display>DocumentLibraryForm</Display>
-  <Edit>DocumentLibraryForm</Edit>
-  <New>DocumentLibraryForm</New>
-</FormTemplates>
-</file>
-
 <file path=customXml/itemProps1.xml><?xml version="1.0" encoding="utf-8"?>
 <ds:datastoreItem xmlns:ds="http://schemas.openxmlformats.org/officeDocument/2006/customXml" ds:itemID="{958A2EA8-4641-42F6-A17F-431287DED999}">
   <ds:schemaRefs>
@@ -32801,6 +32821,14 @@
 </file>
 
 <file path=customXml/itemProps2.xml><?xml version="1.0" encoding="utf-8"?>
+<ds:datastoreItem xmlns:ds="http://schemas.openxmlformats.org/officeDocument/2006/customXml" ds:itemID="{3AA12886-63C9-4300-8B68-1ADB4934159B}">
+  <ds:schemaRefs>
+    <ds:schemaRef ds:uri="http://schemas.microsoft.com/sharepoint/v3/contenttype/forms"/>
+  </ds:schemaRefs>
+</ds:datastoreItem>
+</file>
+
+<file path=customXml/itemProps3.xml><?xml version="1.0" encoding="utf-8"?>
 <ds:datastoreItem xmlns:ds="http://schemas.openxmlformats.org/officeDocument/2006/customXml" ds:itemID="{741BB8E0-F7E5-448E-9DB1-27528C7937F6}">
   <ds:schemaRefs>
     <ds:schemaRef ds:uri="http://schemas.microsoft.com/office/2006/metadata/contentType"/>
@@ -32816,12 +32844,4 @@
     <ds:schemaRef ds:uri="http://schemas.microsoft.com/internal/obd"/>
   </ds:schemaRefs>
 </ds:datastoreItem>
-</file>
-
-<file path=customXml/itemProps3.xml><?xml version="1.0" encoding="utf-8"?>
-<ds:datastoreItem xmlns:ds="http://schemas.openxmlformats.org/officeDocument/2006/customXml" ds:itemID="{3AA12886-63C9-4300-8B68-1ADB4934159B}">
-  <ds:schemaRefs>
-    <ds:schemaRef ds:uri="http://schemas.microsoft.com/sharepoint/v3/contenttype/forms"/>
-  </ds:schemaRefs>
-</ds:datastoreItem>
 </file>
</xml_diff>